<commit_message>
Add projection logic and a read_store.
</commit_message>
<xml_diff>
--- a/cqrs-with-erlang.pptx
+++ b/cqrs-with-erlang.pptx
@@ -7,6 +7,9 @@
   <p:notesMasterIdLst>
     <p:notesMasterId r:id="rId6"/>
   </p:notesMasterIdLst>
+  <p:handoutMasterIdLst>
+    <p:handoutMasterId r:id="rId7"/>
+  </p:handoutMasterIdLst>
   <p:sldIdLst>
     <p:sldId id="256" r:id="rId2"/>
     <p:sldId id="257" r:id="rId3"/>
@@ -14,7 +17,7 @@
     <p:sldId id="258" r:id="rId5"/>
   </p:sldIdLst>
   <p:sldSz cx="9144000" cy="6858000" type="screen4x3"/>
-  <p:notesSz cx="6858000" cy="9144000"/>
+  <p:notesSz cx="6881813" cy="9296400"/>
   <p:defaultTextStyle>
     <a:defPPr>
       <a:defRPr lang="en-US"/>
@@ -118,6 +121,171 @@
 </p:presentation>
 </file>
 
+<file path=ppt/handoutMasters/handoutMaster1.xml><?xml version="1.0" encoding="utf-8"?>
+<p:handoutMaster xmlns:a="http://schemas.openxmlformats.org/drawingml/2006/main" xmlns:r="http://schemas.openxmlformats.org/officeDocument/2006/relationships" xmlns:p="http://schemas.openxmlformats.org/presentationml/2006/main">
+  <p:cSld>
+    <p:bg>
+      <p:bgRef idx="1001">
+        <a:schemeClr val="bg1"/>
+      </p:bgRef>
+    </p:bg>
+    <p:spTree>
+      <p:nvGrpSpPr>
+        <p:cNvPr id="1" name=""/>
+        <p:cNvGrpSpPr/>
+        <p:nvPr/>
+      </p:nvGrpSpPr>
+      <p:grpSpPr>
+        <a:xfrm>
+          <a:off x="0" y="0"/>
+          <a:ext cx="0" cy="0"/>
+          <a:chOff x="0" y="0"/>
+          <a:chExt cx="0" cy="0"/>
+        </a:xfrm>
+      </p:grpSpPr>
+      <p:sp>
+        <p:nvSpPr>
+          <p:cNvPr id="2" name="Header Placeholder 1"/>
+          <p:cNvSpPr>
+            <a:spLocks noGrp="1"/>
+          </p:cNvSpPr>
+          <p:nvPr>
+            <p:ph type="hdr" sz="quarter"/>
+          </p:nvPr>
+        </p:nvSpPr>
+        <p:spPr>
+          <a:xfrm>
+            <a:off x="0" y="0"/>
+            <a:ext cx="2982119" cy="466434"/>
+          </a:xfrm>
+          <a:prstGeom prst="rect">
+            <a:avLst/>
+          </a:prstGeom>
+        </p:spPr>
+        <p:txBody>
+          <a:bodyPr vert="horz" lIns="92446" tIns="46223" rIns="92446" bIns="46223" rtlCol="0"/>
+          <a:lstStyle>
+            <a:lvl1pPr algn="l">
+              <a:defRPr sz="1200"/>
+            </a:lvl1pPr>
+          </a:lstStyle>
+          <a:p>
+            <a:endParaRPr lang="en-US"/>
+          </a:p>
+        </p:txBody>
+      </p:sp>
+      <p:sp>
+        <p:nvSpPr>
+          <p:cNvPr id="3" name="Date Placeholder 2"/>
+          <p:cNvSpPr>
+            <a:spLocks noGrp="1"/>
+          </p:cNvSpPr>
+          <p:nvPr>
+            <p:ph type="dt" sz="quarter" idx="1"/>
+          </p:nvPr>
+        </p:nvSpPr>
+        <p:spPr>
+          <a:xfrm>
+            <a:off x="3898102" y="0"/>
+            <a:ext cx="2982119" cy="466434"/>
+          </a:xfrm>
+          <a:prstGeom prst="rect">
+            <a:avLst/>
+          </a:prstGeom>
+        </p:spPr>
+        <p:txBody>
+          <a:bodyPr vert="horz" lIns="92446" tIns="46223" rIns="92446" bIns="46223" rtlCol="0"/>
+          <a:lstStyle>
+            <a:lvl1pPr algn="r">
+              <a:defRPr sz="1200"/>
+            </a:lvl1pPr>
+          </a:lstStyle>
+          <a:p>
+            <a:fld id="{5DF7B94A-3135-4529-93D6-E1241C219012}" type="datetimeFigureOut">
+              <a:rPr lang="en-US" smtClean="0"/>
+              <a:t>9/17/2013</a:t>
+            </a:fld>
+            <a:endParaRPr lang="en-US"/>
+          </a:p>
+        </p:txBody>
+      </p:sp>
+      <p:sp>
+        <p:nvSpPr>
+          <p:cNvPr id="4" name="Footer Placeholder 3"/>
+          <p:cNvSpPr>
+            <a:spLocks noGrp="1"/>
+          </p:cNvSpPr>
+          <p:nvPr>
+            <p:ph type="ftr" sz="quarter" idx="2"/>
+          </p:nvPr>
+        </p:nvSpPr>
+        <p:spPr>
+          <a:xfrm>
+            <a:off x="0" y="8829967"/>
+            <a:ext cx="2982119" cy="466433"/>
+          </a:xfrm>
+          <a:prstGeom prst="rect">
+            <a:avLst/>
+          </a:prstGeom>
+        </p:spPr>
+        <p:txBody>
+          <a:bodyPr vert="horz" lIns="92446" tIns="46223" rIns="92446" bIns="46223" rtlCol="0" anchor="b"/>
+          <a:lstStyle>
+            <a:lvl1pPr algn="l">
+              <a:defRPr sz="1200"/>
+            </a:lvl1pPr>
+          </a:lstStyle>
+          <a:p>
+            <a:endParaRPr lang="en-US"/>
+          </a:p>
+        </p:txBody>
+      </p:sp>
+      <p:sp>
+        <p:nvSpPr>
+          <p:cNvPr id="5" name="Slide Number Placeholder 4"/>
+          <p:cNvSpPr>
+            <a:spLocks noGrp="1"/>
+          </p:cNvSpPr>
+          <p:nvPr>
+            <p:ph type="sldNum" sz="quarter" idx="3"/>
+          </p:nvPr>
+        </p:nvSpPr>
+        <p:spPr>
+          <a:xfrm>
+            <a:off x="3898102" y="8829967"/>
+            <a:ext cx="2982119" cy="466433"/>
+          </a:xfrm>
+          <a:prstGeom prst="rect">
+            <a:avLst/>
+          </a:prstGeom>
+        </p:spPr>
+        <p:txBody>
+          <a:bodyPr vert="horz" lIns="92446" tIns="46223" rIns="92446" bIns="46223" rtlCol="0" anchor="b"/>
+          <a:lstStyle>
+            <a:lvl1pPr algn="r">
+              <a:defRPr sz="1200"/>
+            </a:lvl1pPr>
+          </a:lstStyle>
+          <a:p>
+            <a:fld id="{68E06774-79B3-45CD-B013-C7AD74DFAD5B}" type="slidenum">
+              <a:rPr lang="en-US" smtClean="0"/>
+              <a:t>‹#›</a:t>
+            </a:fld>
+            <a:endParaRPr lang="en-US"/>
+          </a:p>
+        </p:txBody>
+      </p:sp>
+    </p:spTree>
+    <p:extLst>
+      <p:ext uri="{BB962C8B-B14F-4D97-AF65-F5344CB8AC3E}">
+        <p14:creationId xmlns:p14="http://schemas.microsoft.com/office/powerpoint/2010/main" val="1002841865"/>
+      </p:ext>
+    </p:extLst>
+  </p:cSld>
+  <p:clrMap bg1="lt1" tx1="dk1" bg2="lt2" tx2="dk2" accent1="accent1" accent2="accent2" accent3="accent3" accent4="accent4" accent5="accent5" accent6="accent6" hlink="hlink" folHlink="folHlink"/>
+</p:handoutMaster>
+</file>
+
 <file path=ppt/notesMasters/notesMaster1.xml><?xml version="1.0" encoding="utf-8"?>
 <p:notesMaster xmlns:a="http://schemas.openxmlformats.org/drawingml/2006/main" xmlns:r="http://schemas.openxmlformats.org/officeDocument/2006/relationships" xmlns:p="http://schemas.openxmlformats.org/presentationml/2006/main">
   <p:cSld>
@@ -153,14 +321,14 @@
         <p:spPr>
           <a:xfrm>
             <a:off x="0" y="0"/>
-            <a:ext cx="2971800" cy="458788"/>
+            <a:ext cx="2982119" cy="466434"/>
           </a:xfrm>
           <a:prstGeom prst="rect">
             <a:avLst/>
           </a:prstGeom>
         </p:spPr>
         <p:txBody>
-          <a:bodyPr vert="horz" lIns="91440" tIns="45720" rIns="91440" bIns="45720" rtlCol="0"/>
+          <a:bodyPr vert="horz" lIns="92446" tIns="46223" rIns="92446" bIns="46223" rtlCol="0"/>
           <a:lstStyle>
             <a:lvl1pPr algn="l">
               <a:defRPr sz="1200"/>
@@ -183,15 +351,15 @@
         </p:nvSpPr>
         <p:spPr>
           <a:xfrm>
-            <a:off x="3884613" y="0"/>
-            <a:ext cx="2971800" cy="458788"/>
+            <a:off x="3898102" y="0"/>
+            <a:ext cx="2982119" cy="466434"/>
           </a:xfrm>
           <a:prstGeom prst="rect">
             <a:avLst/>
           </a:prstGeom>
         </p:spPr>
         <p:txBody>
-          <a:bodyPr vert="horz" lIns="91440" tIns="45720" rIns="91440" bIns="45720" rtlCol="0"/>
+          <a:bodyPr vert="horz" lIns="92446" tIns="46223" rIns="92446" bIns="46223" rtlCol="0"/>
           <a:lstStyle>
             <a:lvl1pPr algn="r">
               <a:defRPr sz="1200"/>
@@ -200,7 +368,7 @@
           <a:p>
             <a:fld id="{9E990867-4F19-4D12-BC85-3B0C48406CF9}" type="datetimeFigureOut">
               <a:rPr lang="en-US" smtClean="0"/>
-              <a:t>9/14/2013</a:t>
+              <a:t>9/17/2013</a:t>
             </a:fld>
             <a:endParaRPr lang="en-US"/>
           </a:p>
@@ -218,8 +386,8 @@
         </p:nvSpPr>
         <p:spPr>
           <a:xfrm>
-            <a:off x="1371600" y="1143000"/>
-            <a:ext cx="4114800" cy="3086100"/>
+            <a:off x="1350963" y="1162050"/>
+            <a:ext cx="4179887" cy="3136900"/>
           </a:xfrm>
           <a:prstGeom prst="rect">
             <a:avLst/>
@@ -232,7 +400,7 @@
           </a:ln>
         </p:spPr>
         <p:txBody>
-          <a:bodyPr vert="horz" lIns="91440" tIns="45720" rIns="91440" bIns="45720" rtlCol="0" anchor="ctr"/>
+          <a:bodyPr vert="horz" lIns="92446" tIns="46223" rIns="92446" bIns="46223" rtlCol="0" anchor="ctr"/>
           <a:lstStyle/>
           <a:p>
             <a:endParaRPr lang="en-US"/>
@@ -251,15 +419,15 @@
         </p:nvSpPr>
         <p:spPr>
           <a:xfrm>
-            <a:off x="685800" y="4400550"/>
-            <a:ext cx="5486400" cy="3600450"/>
+            <a:off x="688182" y="4473892"/>
+            <a:ext cx="5505450" cy="3660458"/>
           </a:xfrm>
           <a:prstGeom prst="rect">
             <a:avLst/>
           </a:prstGeom>
         </p:spPr>
         <p:txBody>
-          <a:bodyPr vert="horz" lIns="91440" tIns="45720" rIns="91440" bIns="45720" rtlCol="0"/>
+          <a:bodyPr vert="horz" lIns="92446" tIns="46223" rIns="92446" bIns="46223" rtlCol="0"/>
           <a:lstStyle/>
           <a:p>
             <a:pPr lvl="0"/>
@@ -311,15 +479,15 @@
         </p:nvSpPr>
         <p:spPr>
           <a:xfrm>
-            <a:off x="0" y="8685213"/>
-            <a:ext cx="2971800" cy="458787"/>
+            <a:off x="0" y="8829967"/>
+            <a:ext cx="2982119" cy="466433"/>
           </a:xfrm>
           <a:prstGeom prst="rect">
             <a:avLst/>
           </a:prstGeom>
         </p:spPr>
         <p:txBody>
-          <a:bodyPr vert="horz" lIns="91440" tIns="45720" rIns="91440" bIns="45720" rtlCol="0" anchor="b"/>
+          <a:bodyPr vert="horz" lIns="92446" tIns="46223" rIns="92446" bIns="46223" rtlCol="0" anchor="b"/>
           <a:lstStyle>
             <a:lvl1pPr algn="l">
               <a:defRPr sz="1200"/>
@@ -342,15 +510,15 @@
         </p:nvSpPr>
         <p:spPr>
           <a:xfrm>
-            <a:off x="3884613" y="8685213"/>
-            <a:ext cx="2971800" cy="458787"/>
+            <a:off x="3898102" y="8829967"/>
+            <a:ext cx="2982119" cy="466433"/>
           </a:xfrm>
           <a:prstGeom prst="rect">
             <a:avLst/>
           </a:prstGeom>
         </p:spPr>
         <p:txBody>
-          <a:bodyPr vert="horz" lIns="91440" tIns="45720" rIns="91440" bIns="45720" rtlCol="0" anchor="b"/>
+          <a:bodyPr vert="horz" lIns="92446" tIns="46223" rIns="92446" bIns="46223" rtlCol="0" anchor="b"/>
           <a:lstStyle>
             <a:lvl1pPr algn="r">
               <a:defRPr sz="1200"/>
@@ -773,7 +941,7 @@
           <a:p>
             <a:fld id="{40021591-90BC-47EB-9B50-289D6F65777F}" type="datetimeFigureOut">
               <a:rPr lang="en-US" smtClean="0"/>
-              <a:t>9/14/2013</a:t>
+              <a:t>9/17/2013</a:t>
             </a:fld>
             <a:endParaRPr lang="en-US"/>
           </a:p>
@@ -943,7 +1111,7 @@
           <a:p>
             <a:fld id="{40021591-90BC-47EB-9B50-289D6F65777F}" type="datetimeFigureOut">
               <a:rPr lang="en-US" smtClean="0"/>
-              <a:t>9/14/2013</a:t>
+              <a:t>9/17/2013</a:t>
             </a:fld>
             <a:endParaRPr lang="en-US"/>
           </a:p>
@@ -1123,7 +1291,7 @@
           <a:p>
             <a:fld id="{40021591-90BC-47EB-9B50-289D6F65777F}" type="datetimeFigureOut">
               <a:rPr lang="en-US" smtClean="0"/>
-              <a:t>9/14/2013</a:t>
+              <a:t>9/17/2013</a:t>
             </a:fld>
             <a:endParaRPr lang="en-US"/>
           </a:p>
@@ -1293,7 +1461,7 @@
           <a:p>
             <a:fld id="{40021591-90BC-47EB-9B50-289D6F65777F}" type="datetimeFigureOut">
               <a:rPr lang="en-US" smtClean="0"/>
-              <a:t>9/14/2013</a:t>
+              <a:t>9/17/2013</a:t>
             </a:fld>
             <a:endParaRPr lang="en-US"/>
           </a:p>
@@ -1537,7 +1705,7 @@
           <a:p>
             <a:fld id="{40021591-90BC-47EB-9B50-289D6F65777F}" type="datetimeFigureOut">
               <a:rPr lang="en-US" smtClean="0"/>
-              <a:t>9/14/2013</a:t>
+              <a:t>9/17/2013</a:t>
             </a:fld>
             <a:endParaRPr lang="en-US"/>
           </a:p>
@@ -1769,7 +1937,7 @@
           <a:p>
             <a:fld id="{40021591-90BC-47EB-9B50-289D6F65777F}" type="datetimeFigureOut">
               <a:rPr lang="en-US" smtClean="0"/>
-              <a:t>9/14/2013</a:t>
+              <a:t>9/17/2013</a:t>
             </a:fld>
             <a:endParaRPr lang="en-US"/>
           </a:p>
@@ -2136,7 +2304,7 @@
           <a:p>
             <a:fld id="{40021591-90BC-47EB-9B50-289D6F65777F}" type="datetimeFigureOut">
               <a:rPr lang="en-US" smtClean="0"/>
-              <a:t>9/14/2013</a:t>
+              <a:t>9/17/2013</a:t>
             </a:fld>
             <a:endParaRPr lang="en-US"/>
           </a:p>
@@ -2254,7 +2422,7 @@
           <a:p>
             <a:fld id="{40021591-90BC-47EB-9B50-289D6F65777F}" type="datetimeFigureOut">
               <a:rPr lang="en-US" smtClean="0"/>
-              <a:t>9/14/2013</a:t>
+              <a:t>9/17/2013</a:t>
             </a:fld>
             <a:endParaRPr lang="en-US"/>
           </a:p>
@@ -2349,7 +2517,7 @@
           <a:p>
             <a:fld id="{40021591-90BC-47EB-9B50-289D6F65777F}" type="datetimeFigureOut">
               <a:rPr lang="en-US" smtClean="0"/>
-              <a:t>9/14/2013</a:t>
+              <a:t>9/17/2013</a:t>
             </a:fld>
             <a:endParaRPr lang="en-US"/>
           </a:p>
@@ -2626,7 +2794,7 @@
           <a:p>
             <a:fld id="{40021591-90BC-47EB-9B50-289D6F65777F}" type="datetimeFigureOut">
               <a:rPr lang="en-US" smtClean="0"/>
-              <a:t>9/14/2013</a:t>
+              <a:t>9/17/2013</a:t>
             </a:fld>
             <a:endParaRPr lang="en-US"/>
           </a:p>
@@ -2883,7 +3051,7 @@
           <a:p>
             <a:fld id="{40021591-90BC-47EB-9B50-289D6F65777F}" type="datetimeFigureOut">
               <a:rPr lang="en-US" smtClean="0"/>
-              <a:t>9/14/2013</a:t>
+              <a:t>9/17/2013</a:t>
             </a:fld>
             <a:endParaRPr lang="en-US"/>
           </a:p>
@@ -3096,7 +3264,7 @@
           <a:p>
             <a:fld id="{40021591-90BC-47EB-9B50-289D6F65777F}" type="datetimeFigureOut">
               <a:rPr lang="en-US" smtClean="0"/>
-              <a:t>9/14/2013</a:t>
+              <a:t>9/17/2013</a:t>
             </a:fld>
             <a:endParaRPr lang="en-US"/>
           </a:p>
@@ -4525,7 +4693,7 @@
         </p:spPr>
         <p:txBody>
           <a:bodyPr numCol="2">
-            <a:normAutofit/>
+            <a:normAutofit fontScale="92500" lnSpcReduction="10000"/>
           </a:bodyPr>
           <a:lstStyle/>
           <a:p>
@@ -4538,49 +4706,164 @@
             <a:pPr lvl="1"/>
             <a:r>
               <a:rPr lang="en-US" sz="2000" dirty="0" smtClean="0"/>
-              <a:t>DDD seems right, but implementation is compromised</a:t>
+              <a:t>DDD </a:t>
+            </a:r>
+            <a:r>
+              <a:rPr lang="en-US" sz="2000" dirty="0" smtClean="0"/>
+              <a:t>seems right, but </a:t>
+            </a:r>
+            <a:r>
+              <a:rPr lang="en-US" sz="2000" dirty="0" smtClean="0"/>
+              <a:t>is hard</a:t>
             </a:r>
           </a:p>
           <a:p>
             <a:pPr lvl="1"/>
             <a:r>
               <a:rPr lang="en-US" sz="2000" dirty="0" smtClean="0"/>
-              <a:t>The “layered architecture” is ridiculous.</a:t>
+              <a:t>The </a:t>
+            </a:r>
+            <a:r>
+              <a:rPr lang="en-US" sz="2000" dirty="0" smtClean="0"/>
+              <a:t>“layered architecture” is ridiculous</a:t>
+            </a:r>
+            <a:r>
+              <a:rPr lang="en-US" sz="2000" dirty="0" smtClean="0"/>
+              <a:t>.</a:t>
             </a:r>
           </a:p>
           <a:p>
             <a:pPr lvl="1"/>
             <a:r>
+              <a:rPr lang="en-US" sz="2000" dirty="0"/>
+              <a:t>Keep privates </a:t>
+            </a:r>
+            <a:r>
               <a:rPr lang="en-US" sz="2000" dirty="0" smtClean="0"/>
-              <a:t>Captures intent</a:t>
+              <a:t>private</a:t>
             </a:r>
           </a:p>
           <a:p>
             <a:pPr lvl="1"/>
             <a:r>
               <a:rPr lang="en-US" sz="2000" dirty="0" smtClean="0"/>
-              <a:t>The perfect audit</a:t>
+              <a:t>Return focus to business</a:t>
             </a:r>
           </a:p>
           <a:p>
             <a:pPr lvl="1"/>
             <a:r>
               <a:rPr lang="en-US" sz="2000" dirty="0" smtClean="0"/>
-              <a:t>Vary SLA to the business value </a:t>
+              <a:t>Vendor relationships should be consensual</a:t>
             </a:r>
           </a:p>
           <a:p>
             <a:pPr lvl="1"/>
             <a:r>
               <a:rPr lang="en-US" sz="2000" dirty="0" smtClean="0"/>
-              <a:t>Return decision making to business</a:t>
+              <a:t>Scale out</a:t>
             </a:r>
           </a:p>
           <a:p>
             <a:pPr lvl="1"/>
             <a:r>
               <a:rPr lang="en-US" sz="2000" dirty="0" smtClean="0"/>
-              <a:t>Division of labor</a:t>
+              <a:t>Simplify conflicts</a:t>
+            </a:r>
+          </a:p>
+          <a:p>
+            <a:pPr lvl="1"/>
+            <a:r>
+              <a:rPr lang="en-US" sz="2000" dirty="0" smtClean="0"/>
+              <a:t>Return </a:t>
+            </a:r>
+            <a:r>
+              <a:rPr lang="en-US" sz="2000" dirty="0"/>
+              <a:t>decision making to </a:t>
+            </a:r>
+            <a:r>
+              <a:rPr lang="en-US" sz="2000" dirty="0" smtClean="0"/>
+              <a:t>business</a:t>
+            </a:r>
+          </a:p>
+          <a:p>
+            <a:pPr lvl="2"/>
+            <a:r>
+              <a:rPr lang="en-US" sz="1600" dirty="0"/>
+              <a:t>Tunable </a:t>
+            </a:r>
+            <a:r>
+              <a:rPr lang="en-US" sz="1600" dirty="0" smtClean="0"/>
+              <a:t>CAP</a:t>
+            </a:r>
+          </a:p>
+          <a:p>
+            <a:pPr lvl="2"/>
+            <a:r>
+              <a:rPr lang="en-US" sz="1600" dirty="0" smtClean="0"/>
+              <a:t>Explicit &amp; tunable staleness</a:t>
+            </a:r>
+          </a:p>
+          <a:p>
+            <a:pPr lvl="2"/>
+            <a:r>
+              <a:rPr lang="en-US" sz="1600" dirty="0"/>
+              <a:t>Vary SLA to the business value</a:t>
+            </a:r>
+            <a:endParaRPr lang="en-US" sz="1600" dirty="0" smtClean="0"/>
+          </a:p>
+          <a:p>
+            <a:pPr lvl="1"/>
+            <a:r>
+              <a:rPr lang="en-US" sz="2000" dirty="0" smtClean="0"/>
+              <a:t>The </a:t>
+            </a:r>
+            <a:r>
+              <a:rPr lang="en-US" sz="2000" dirty="0" smtClean="0"/>
+              <a:t>perfect </a:t>
+            </a:r>
+            <a:r>
+              <a:rPr lang="en-US" sz="2000" dirty="0" smtClean="0"/>
+              <a:t>audit</a:t>
+            </a:r>
+          </a:p>
+          <a:p>
+            <a:pPr lvl="1"/>
+            <a:r>
+              <a:rPr lang="en-US" sz="2000" dirty="0"/>
+              <a:t>Captures </a:t>
+            </a:r>
+            <a:r>
+              <a:rPr lang="en-US" sz="2000" dirty="0" smtClean="0"/>
+              <a:t>intent (fortune telling)</a:t>
+            </a:r>
+            <a:endParaRPr lang="en-US" sz="2000" dirty="0" smtClean="0"/>
+          </a:p>
+          <a:p>
+            <a:pPr lvl="1"/>
+            <a:r>
+              <a:rPr lang="en-US" sz="2000" dirty="0"/>
+              <a:t>CQRS is </a:t>
+            </a:r>
+            <a:r>
+              <a:rPr lang="en-US" sz="2000" dirty="0" smtClean="0"/>
+              <a:t>Heresy</a:t>
+            </a:r>
+            <a:r>
+              <a:rPr lang="en-US" sz="2000" dirty="0" smtClean="0"/>
+              <a:t> </a:t>
+            </a:r>
+            <a:endParaRPr lang="en-US" sz="2000" dirty="0" smtClean="0"/>
+          </a:p>
+          <a:p>
+            <a:pPr lvl="1"/>
+            <a:r>
+              <a:rPr lang="en-US" sz="2000" dirty="0" smtClean="0"/>
+              <a:t>Division </a:t>
+            </a:r>
+            <a:r>
+              <a:rPr lang="en-US" sz="2000" dirty="0" smtClean="0"/>
+              <a:t>of labor</a:t>
             </a:r>
           </a:p>
           <a:p>
@@ -4959,11 +5242,7 @@
             <a:pPr lvl="2"/>
             <a:r>
               <a:rPr lang="en-US" sz="1400" dirty="0" smtClean="0"/>
-              <a:t>Who news these up</a:t>
-            </a:r>
-            <a:r>
-              <a:rPr lang="en-US" sz="1400" dirty="0" smtClean="0"/>
-              <a:t>? </a:t>
+              <a:t>Who news these up? </a:t>
             </a:r>
           </a:p>
           <a:p>
@@ -5597,4 +5876,265 @@
     </a:ext>
   </a:extLst>
 </a:theme>
+</file>
+
+<file path=ppt/theme/theme3.xml><?xml version="1.0" encoding="utf-8"?>
+<a:theme xmlns:a="http://schemas.openxmlformats.org/drawingml/2006/main" name="Office Theme">
+  <a:themeElements>
+    <a:clrScheme name="Office">
+      <a:dk1>
+        <a:sysClr val="windowText" lastClr="000000"/>
+      </a:dk1>
+      <a:lt1>
+        <a:sysClr val="window" lastClr="FFFFFF"/>
+      </a:lt1>
+      <a:dk2>
+        <a:srgbClr val="44546A"/>
+      </a:dk2>
+      <a:lt2>
+        <a:srgbClr val="E7E6E6"/>
+      </a:lt2>
+      <a:accent1>
+        <a:srgbClr val="5B9BD5"/>
+      </a:accent1>
+      <a:accent2>
+        <a:srgbClr val="ED7D31"/>
+      </a:accent2>
+      <a:accent3>
+        <a:srgbClr val="A5A5A5"/>
+      </a:accent3>
+      <a:accent4>
+        <a:srgbClr val="FFC000"/>
+      </a:accent4>
+      <a:accent5>
+        <a:srgbClr val="4472C4"/>
+      </a:accent5>
+      <a:accent6>
+        <a:srgbClr val="70AD47"/>
+      </a:accent6>
+      <a:hlink>
+        <a:srgbClr val="0563C1"/>
+      </a:hlink>
+      <a:folHlink>
+        <a:srgbClr val="954F72"/>
+      </a:folHlink>
+    </a:clrScheme>
+    <a:fontScheme name="Office">
+      <a:majorFont>
+        <a:latin typeface="Calibri Light" panose="020F0302020204030204"/>
+        <a:ea typeface=""/>
+        <a:cs typeface=""/>
+        <a:font script="Jpan" typeface="ＭＳ Ｐゴシック"/>
+        <a:font script="Hang" typeface="맑은 고딕"/>
+        <a:font script="Hans" typeface="宋体"/>
+        <a:font script="Hant" typeface="新細明體"/>
+        <a:font script="Arab" typeface="Times New Roman"/>
+        <a:font script="Hebr" typeface="Times New Roman"/>
+        <a:font script="Thai" typeface="Angsana New"/>
+        <a:font script="Ethi" typeface="Nyala"/>
+        <a:font script="Beng" typeface="Vrinda"/>
+        <a:font script="Gujr" typeface="Shruti"/>
+        <a:font script="Khmr" typeface="MoolBoran"/>
+        <a:font script="Knda" typeface="Tunga"/>
+        <a:font script="Guru" typeface="Raavi"/>
+        <a:font script="Cans" typeface="Euphemia"/>
+        <a:font script="Cher" typeface="Plantagenet Cherokee"/>
+        <a:font script="Yiii" typeface="Microsoft Yi Baiti"/>
+        <a:font script="Tibt" typeface="Microsoft Himalaya"/>
+        <a:font script="Thaa" typeface="MV Boli"/>
+        <a:font script="Deva" typeface="Mangal"/>
+        <a:font script="Telu" typeface="Gautami"/>
+        <a:font script="Taml" typeface="Latha"/>
+        <a:font script="Syrc" typeface="Estrangelo Edessa"/>
+        <a:font script="Orya" typeface="Kalinga"/>
+        <a:font script="Mlym" typeface="Kartika"/>
+        <a:font script="Laoo" typeface="DokChampa"/>
+        <a:font script="Sinh" typeface="Iskoola Pota"/>
+        <a:font script="Mong" typeface="Mongolian Baiti"/>
+        <a:font script="Viet" typeface="Times New Roman"/>
+        <a:font script="Uigh" typeface="Microsoft Uighur"/>
+        <a:font script="Geor" typeface="Sylfaen"/>
+      </a:majorFont>
+      <a:minorFont>
+        <a:latin typeface="Calibri" panose="020F0502020204030204"/>
+        <a:ea typeface=""/>
+        <a:cs typeface=""/>
+        <a:font script="Jpan" typeface="ＭＳ Ｐゴシック"/>
+        <a:font script="Hang" typeface="맑은 고딕"/>
+        <a:font script="Hans" typeface="宋体"/>
+        <a:font script="Hant" typeface="新細明體"/>
+        <a:font script="Arab" typeface="Arial"/>
+        <a:font script="Hebr" typeface="Arial"/>
+        <a:font script="Thai" typeface="Cordia New"/>
+        <a:font script="Ethi" typeface="Nyala"/>
+        <a:font script="Beng" typeface="Vrinda"/>
+        <a:font script="Gujr" typeface="Shruti"/>
+        <a:font script="Khmr" typeface="DaunPenh"/>
+        <a:font script="Knda" typeface="Tunga"/>
+        <a:font script="Guru" typeface="Raavi"/>
+        <a:font script="Cans" typeface="Euphemia"/>
+        <a:font script="Cher" typeface="Plantagenet Cherokee"/>
+        <a:font script="Yiii" typeface="Microsoft Yi Baiti"/>
+        <a:font script="Tibt" typeface="Microsoft Himalaya"/>
+        <a:font script="Thaa" typeface="MV Boli"/>
+        <a:font script="Deva" typeface="Mangal"/>
+        <a:font script="Telu" typeface="Gautami"/>
+        <a:font script="Taml" typeface="Latha"/>
+        <a:font script="Syrc" typeface="Estrangelo Edessa"/>
+        <a:font script="Orya" typeface="Kalinga"/>
+        <a:font script="Mlym" typeface="Kartika"/>
+        <a:font script="Laoo" typeface="DokChampa"/>
+        <a:font script="Sinh" typeface="Iskoola Pota"/>
+        <a:font script="Mong" typeface="Mongolian Baiti"/>
+        <a:font script="Viet" typeface="Arial"/>
+        <a:font script="Uigh" typeface="Microsoft Uighur"/>
+        <a:font script="Geor" typeface="Sylfaen"/>
+      </a:minorFont>
+    </a:fontScheme>
+    <a:fmtScheme name="Office">
+      <a:fillStyleLst>
+        <a:solidFill>
+          <a:schemeClr val="phClr"/>
+        </a:solidFill>
+        <a:gradFill rotWithShape="1">
+          <a:gsLst>
+            <a:gs pos="0">
+              <a:schemeClr val="phClr">
+                <a:lumMod val="110000"/>
+                <a:satMod val="105000"/>
+                <a:tint val="67000"/>
+              </a:schemeClr>
+            </a:gs>
+            <a:gs pos="50000">
+              <a:schemeClr val="phClr">
+                <a:lumMod val="105000"/>
+                <a:satMod val="103000"/>
+                <a:tint val="73000"/>
+              </a:schemeClr>
+            </a:gs>
+            <a:gs pos="100000">
+              <a:schemeClr val="phClr">
+                <a:lumMod val="105000"/>
+                <a:satMod val="109000"/>
+                <a:tint val="81000"/>
+              </a:schemeClr>
+            </a:gs>
+          </a:gsLst>
+          <a:lin ang="5400000" scaled="0"/>
+        </a:gradFill>
+        <a:gradFill rotWithShape="1">
+          <a:gsLst>
+            <a:gs pos="0">
+              <a:schemeClr val="phClr">
+                <a:satMod val="103000"/>
+                <a:lumMod val="102000"/>
+                <a:tint val="94000"/>
+              </a:schemeClr>
+            </a:gs>
+            <a:gs pos="50000">
+              <a:schemeClr val="phClr">
+                <a:satMod val="110000"/>
+                <a:lumMod val="100000"/>
+                <a:shade val="100000"/>
+              </a:schemeClr>
+            </a:gs>
+            <a:gs pos="100000">
+              <a:schemeClr val="phClr">
+                <a:lumMod val="99000"/>
+                <a:satMod val="120000"/>
+                <a:shade val="78000"/>
+              </a:schemeClr>
+            </a:gs>
+          </a:gsLst>
+          <a:lin ang="5400000" scaled="0"/>
+        </a:gradFill>
+      </a:fillStyleLst>
+      <a:lnStyleLst>
+        <a:ln w="6350" cap="flat" cmpd="sng" algn="ctr">
+          <a:solidFill>
+            <a:schemeClr val="phClr"/>
+          </a:solidFill>
+          <a:prstDash val="solid"/>
+          <a:miter lim="800000"/>
+        </a:ln>
+        <a:ln w="12700" cap="flat" cmpd="sng" algn="ctr">
+          <a:solidFill>
+            <a:schemeClr val="phClr"/>
+          </a:solidFill>
+          <a:prstDash val="solid"/>
+          <a:miter lim="800000"/>
+        </a:ln>
+        <a:ln w="19050" cap="flat" cmpd="sng" algn="ctr">
+          <a:solidFill>
+            <a:schemeClr val="phClr"/>
+          </a:solidFill>
+          <a:prstDash val="solid"/>
+          <a:miter lim="800000"/>
+        </a:ln>
+      </a:lnStyleLst>
+      <a:effectStyleLst>
+        <a:effectStyle>
+          <a:effectLst/>
+        </a:effectStyle>
+        <a:effectStyle>
+          <a:effectLst/>
+        </a:effectStyle>
+        <a:effectStyle>
+          <a:effectLst>
+            <a:outerShdw blurRad="57150" dist="19050" dir="5400000" algn="ctr" rotWithShape="0">
+              <a:srgbClr val="000000">
+                <a:alpha val="63000"/>
+              </a:srgbClr>
+            </a:outerShdw>
+          </a:effectLst>
+        </a:effectStyle>
+      </a:effectStyleLst>
+      <a:bgFillStyleLst>
+        <a:solidFill>
+          <a:schemeClr val="phClr"/>
+        </a:solidFill>
+        <a:solidFill>
+          <a:schemeClr val="phClr">
+            <a:tint val="95000"/>
+            <a:satMod val="170000"/>
+          </a:schemeClr>
+        </a:solidFill>
+        <a:gradFill rotWithShape="1">
+          <a:gsLst>
+            <a:gs pos="0">
+              <a:schemeClr val="phClr">
+                <a:tint val="93000"/>
+                <a:satMod val="150000"/>
+                <a:shade val="98000"/>
+                <a:lumMod val="102000"/>
+              </a:schemeClr>
+            </a:gs>
+            <a:gs pos="50000">
+              <a:schemeClr val="phClr">
+                <a:tint val="98000"/>
+                <a:satMod val="130000"/>
+                <a:shade val="90000"/>
+                <a:lumMod val="103000"/>
+              </a:schemeClr>
+            </a:gs>
+            <a:gs pos="100000">
+              <a:schemeClr val="phClr">
+                <a:shade val="63000"/>
+                <a:satMod val="120000"/>
+              </a:schemeClr>
+            </a:gs>
+          </a:gsLst>
+          <a:lin ang="5400000" scaled="0"/>
+        </a:gradFill>
+      </a:bgFillStyleLst>
+    </a:fmtScheme>
+  </a:themeElements>
+  <a:objectDefaults/>
+  <a:extraClrSchemeLst/>
+  <a:extLst>
+    <a:ext uri="{05A4C25C-085E-4340-85A3-A5531E510DB2}">
+      <thm15:themeFamily xmlns:thm15="http://schemas.microsoft.com/office/thememl/2012/main" name="Office Theme" id="{62F939B6-93AF-4DB8-9C6B-D6C7DFDC589F}" vid="{4A3C46E8-61CC-4603-A589-7422A47A8E4A}"/>
+    </a:ext>
+  </a:extLst>
+</a:theme>
 </file>
</xml_diff>